<commit_message>
update all icon buttons
</commit_message>
<xml_diff>
--- a/fastapi-backend/pres/output.pptx
+++ b/fastapi-backend/pres/output.pptx
@@ -3972,14 +3972,14 @@
             </a:pPr>
             <a:r>
               <a:rPr sz="1200"/>
-              <a:t>From 2020 to 2022, Amazon's consolidated net sales increased from $386 billion in 2020 to $514 billion in 2022. Segment-wise, North America saw sales grow from $236 billion to $316 billion (34% growth), AWS sales rose from $45 billion to $80 billion (78% growth), while International sales grew modestly from $104 billion to $118 billion (13% growth). Operating income shows a varying trend: $22.9 billion in 2020, $24.9 billion in 2021, and a drop to $12.2 billion in 2022. The International segment reported the biggest losses in 2022, with a negative operating income of $7.7 billion from less than $1 billion in 2021. AWS consistently improved operating income, contributing $18.5 billion in 2021 and $22.8 billion in 2022. Year-on-year percentage net growth was 22% in 2021 and 9% in 2022. Notably, from 2021 to 2022, North America grew 13%, AWS saw a 29% increase, whereas International experienced an 8% decrease. Service sales, which include AWS, advertising services, and subscription services, contributed significantly to this growth, rising from $170 billion in 2020 to $271 billion in 2022. In terms of profitability, net income fluctuated significantly, reporting net losses in 2022 of $2.7 billion compared to net income of $33.4 billion in 2021 and $21.3 billion in 2020.</a:t>
+              <a:t>The company's revenue and general profit and loss have exhibited consistent growth over the years 2021 to 2023. Here is a synthesized analysis with the key financial metrics and derived trends: 1. Revenue Growth:     - Total revenues grew from $257.6 billion in 2021 to $282.8 billion in 2022, and further to $307.4 billion in 2023. This indicates a Compound Annual Growth Rate (CAGR) of approximately 9%. 2. Revenue Distribution:    - Google Services, comprising Google Search, YouTube ads, and others, continues to dominate, accounting for roughly 89% of 2023 revenues.    - Google Cloud saw significant growth, increasing from $19.2 billion in 2021 to $33.1 billion in 2023, showcasing the importance of cloud services in the revenue mix. 3. Geographical Distribution:    - The U.S. remains the largest market, contributing 46-48% of total revenues from 2021 to 2023. EMEA and APAC are also significant, composing nearly 46% in 2023. 4. Cost and Expenses:    - Costs and expenses increased from $178.9 billion in 2021 to $223.1 billion in 2023. Major cost contributors include the cost of revenues (e.g., content acquisition, infrastructure), research and development, and sales and marketing expenses. 5. Profitability:    - Operating income fluctuated from $78.7 billion in 2021 to $74.8 billion in 2022, then rose to $84.3 billion in 2023. This improvement in 2023 is attributed to increased efficiency and the extended useful life of servers and network equipment, reducing depreciation expenses by about $3.9 billion. 6. Net Income:    - The net income showed variability, dropping from $76.0 billion in 2021 to $60.0 billion in 2022, then rising to $73.8 billion in 2023, highlighting the impact of marketable security fluctuations and operational efficiencies. Derived Trends: - The revenue growth, especially in Google Cloud, indicates a strategic pivot towards diversified services. - The significant R&amp;D spending increase suggests a strong focus on innovation and securing future revenue streams. - The geographical revenue distribution underscores the importance of global operations and the need to manage currency risks. In summary, Alphabet Inc.'s robust revenue growth, strategic investments in cloud services, and operational efficiencies ensure sustained profitability, despite fluctuations in other income and expenses.</a:t>
             </a:r>
           </a:p>
         </p:txBody>
       </p:sp>
       <p:pic>
         <p:nvPicPr>
-          <p:cNvPr id="4" name="Picture 3" descr="revenue_analysis.png"/>
+          <p:cNvPr id="4" name="Picture 3" descr="total_revenue.png"/>
           <p:cNvPicPr>
             <a:picLocks noChangeAspect="1"/>
           </p:cNvPicPr>
@@ -4003,7 +4003,7 @@
       </p:pic>
       <p:pic>
         <p:nvPicPr>
-          <p:cNvPr id="5" name="Picture 4" descr="total_revenue.png"/>
+          <p:cNvPr id="5" name="Picture 4" descr="revenue_by_segment.png"/>
           <p:cNvPicPr>
             <a:picLocks noChangeAspect="1"/>
           </p:cNvPicPr>
@@ -4011,30 +4011,6 @@
         </p:nvPicPr>
         <p:blipFill>
           <a:blip r:embed="rId3"/>
-          <a:stretch>
-            <a:fillRect/>
-          </a:stretch>
-        </p:blipFill>
-        <p:spPr>
-          <a:xfrm>
-            <a:off x="6858000" y="457200"/>
-            <a:ext cx="4572000" cy="2743200"/>
-          </a:xfrm>
-          <a:prstGeom prst="rect">
-            <a:avLst/>
-          </a:prstGeom>
-        </p:spPr>
-      </p:pic>
-      <p:pic>
-        <p:nvPicPr>
-          <p:cNvPr id="6" name="Picture 5" descr="revenue_by_segment.png"/>
-          <p:cNvPicPr>
-            <a:picLocks noChangeAspect="1"/>
-          </p:cNvPicPr>
-          <p:nvPr/>
-        </p:nvPicPr>
-        <p:blipFill>
-          <a:blip r:embed="rId4"/>
           <a:stretch>
             <a:fillRect/>
           </a:stretch>
@@ -4142,7 +4118,7 @@
             </a:pPr>
             <a:r>
               <a:rPr sz="1200"/>
-              <a:t>Amazon's operating income has shown significant fluctuations from 2020 to 2022. In 2020, the operating income stood at $22.899 billion, which increased to $24.879 billion in 2021. However, in 2022, the operating income significantly dropped to $12.248 billion. Segment-wise analysis reveals different trends. North America's operating income decreased from $7.271 billion in 2021 to an operating loss of $2.847 billion in 2022. This shift was mainly due to increased costs related to fulfillment, shipping, and technology investments. The International segment also mirrored this trend, moving from an operating loss of $924 million in 2021 to a further loss of $7.746 billion in 2022. Conversely, AWS (Amazon Web Services) saw its operating income rise from $18.532 billion in 2021 to $22.841 billion in 2022, driven by a combination of increased sales and improved cost structure productivity.</a:t>
+              <a:t>Operating income for Alphabet Inc. experienced notable changes from 2021 to 2023. In 2021, the total operating income was $78.714 billion, which slightly decreased to $74.842 billion in 2022 but rebounded to $84.293 billion in 2023. In terms of segment performance, Google Services consistently contributed the highest operating income: $88.132 billion in 2021, $82.699 billion in 2022, and increased to $95.858 billion in 2023. Google Cloud showed significant improvement, moving from a loss of $2.282 billion in 2021 to a smaller loss of $1.922 billion in 2022, and then turned profitable with an income of $1.716 billion in 2023. The 'Other Bets' segment, however, showed persistent losses, recording a loss of $4.636 billion in 2022 which slightly improved to a loss of $4.095 billion in 2023. These changes are influenced primarily by increases in revenues and strategic expense management across the different segments.</a:t>
             </a:r>
             <a:endParaRPr lang="en-GB" sz="1200" dirty="0"/>
           </a:p>
@@ -4166,54 +4142,6 @@
           <a:xfrm>
             <a:off x="6858000" y="457200"/>
             <a:ext cx="4572000" cy="2743200"/>
-          </a:xfrm>
-          <a:prstGeom prst="rect">
-            <a:avLst/>
-          </a:prstGeom>
-        </p:spPr>
-      </p:pic>
-      <p:pic>
-        <p:nvPicPr>
-          <p:cNvPr id="5" name="Picture 4" descr="consolidated_operating_income.png"/>
-          <p:cNvPicPr>
-            <a:picLocks noChangeAspect="1"/>
-          </p:cNvPicPr>
-          <p:nvPr/>
-        </p:nvPicPr>
-        <p:blipFill>
-          <a:blip r:embed="rId3"/>
-          <a:stretch>
-            <a:fillRect/>
-          </a:stretch>
-        </p:blipFill>
-        <p:spPr>
-          <a:xfrm>
-            <a:off x="6858000" y="457200"/>
-            <a:ext cx="4572000" cy="2286000"/>
-          </a:xfrm>
-          <a:prstGeom prst="rect">
-            <a:avLst/>
-          </a:prstGeom>
-        </p:spPr>
-      </p:pic>
-      <p:pic>
-        <p:nvPicPr>
-          <p:cNvPr id="6" name="Picture 5" descr="operating_income_by_segment.png"/>
-          <p:cNvPicPr>
-            <a:picLocks noChangeAspect="1"/>
-          </p:cNvPicPr>
-          <p:nvPr/>
-        </p:nvPicPr>
-        <p:blipFill>
-          <a:blip r:embed="rId4"/>
-          <a:stretch>
-            <a:fillRect/>
-          </a:stretch>
-        </p:blipFill>
-        <p:spPr>
-          <a:xfrm>
-            <a:off x="6858000" y="3657600"/>
-            <a:ext cx="4572000" cy="2286000"/>
           </a:xfrm>
           <a:prstGeom prst="rect">
             <a:avLst/>
@@ -4313,14 +4241,14 @@
             </a:pPr>
             <a:r>
               <a:rPr sz="1200"/>
-              <a:t>The cash flow of Amazon has experienced notable changes over the years 2020, 2021, and 2022. In terms of operating activities, cash provided was $66.1 billion in 2020, which then reduced to $46.3 billion in 2021 and remained relatively stable at $46.8 billion in 2022. The decline from 2020 to 2021 is primarily attributed to changes in net income and working capital. Cash used in investing activities has also varied significantly. In 2020, cash used was $(59.6) billion, which increased to $(58.2) billion in 2021, and further decreased to $(37.6) billion in 2022. These investments were directed towards property and equipment purchases, reflecting continued investments in technology infrastructure and fulfillment capacity. On the financing front, cash provided was $(1.1) billion in 2020, then increased to $6.3 billion in 2021, and further to $9.7 billion in 2022. The fluctuations in these figures were driven primarily by proceeds from debt and repayments, along with finance leases. Finally, the total cash, cash equivalents, and restricted cash increased from $36.5 billion at the end of 2020 to $54.3 billion by the end of 2022, demonstrating a substantial increase in liquidity over this period.</a:t>
+              <a:t>Alphabet's cash flow has shown notable changes over time: From 2021 to 2023, net cash provided by operating activities increased from $91.7 billion in 2021 to $101.7 billion in 2023. The increase in operating cash flow was primarily driven by higher cash received from customers, despite increases in cash paid for cost of revenues and operating expenses. Investing activities reflected an increasing use of cash, with net cash used in investing activities widening from $35.5 billion in 2021 to $27.1 billion in 2023. This was mainly due to increased purchases of property and equipment, though offset by reduced maturities and sales of marketable securities and payment for acquisitions. With regard to financing activities, net cash used grew from $61.4 billion in 2021 to $72.1 billion in 2023, primarily due to increased stock repurchases. Overall, Alphabet has maintained a robust cash flow, emphasizing its strong operational efficiency and strategic investments for long-term growth.</a:t>
             </a:r>
           </a:p>
         </p:txBody>
       </p:sp>
       <p:pic>
         <p:nvPicPr>
-          <p:cNvPr id="4" name="Picture 3" descr="cash_flow_analysis.png"/>
+          <p:cNvPr id="4" name="Picture 3" descr="cash_flow_trends_over_time.png"/>
           <p:cNvPicPr>
             <a:picLocks noChangeAspect="1"/>
           </p:cNvPicPr>
@@ -4328,30 +4256,6 @@
         </p:nvPicPr>
         <p:blipFill>
           <a:blip r:embed="rId2"/>
-          <a:stretch>
-            <a:fillRect/>
-          </a:stretch>
-        </p:blipFill>
-        <p:spPr>
-          <a:xfrm>
-            <a:off x="6858000" y="457200"/>
-            <a:ext cx="4572000" cy="2743200"/>
-          </a:xfrm>
-          <a:prstGeom prst="rect">
-            <a:avLst/>
-          </a:prstGeom>
-        </p:spPr>
-      </p:pic>
-      <p:pic>
-        <p:nvPicPr>
-          <p:cNvPr id="5" name="Picture 4" descr="amazon_cash_flow_trends.png"/>
-          <p:cNvPicPr>
-            <a:picLocks noChangeAspect="1"/>
-          </p:cNvPicPr>
-          <p:nvPr/>
-        </p:nvPicPr>
-        <p:blipFill>
-          <a:blip r:embed="rId3"/>
           <a:stretch>
             <a:fillRect/>
           </a:stretch>
@@ -4459,7 +4363,7 @@
             </a:pPr>
             <a:r>
               <a:rPr sz="1200"/>
-              <a:t>- PBT Margin: For 2021 and 2022, the operating income (used here as a proxy for PBT) was $24.9 billion and $12.2 billion, respectively, with net sales of $469.8 billion and $514 billion. The PBT margins are approximately 5.3% for 2021 and 2.4% for 2022. - Cost of Risk: The impairments and expenses in 2022 were $1.24 billion (impairments of $1.1 billion and $140 million in lease terminations). For 2021, specific cost of risks figures not directly available, making it challenging to compare. - Net Interest Margin: Not explicitly provided in the data. The information related to interest paid and interest components can indirectly suggest activities, but explicit calculations remain limited. - Return on Tangible Equity (ROTE): With net income of $33.4 billion for 2021 and net loss of $2.7 billion for 2022 coupled with stockholders' equity values ($138.2 billion in 2021 and $146 billion in 2022), ROTE was positive for 2021 but negative for 2022. These KPIs reflect a significant decrease in performance year-over-year, with substantial drops in profitability margins and increased costs of risk in 2022.</a:t>
+              <a:t>PBT Margin: - 2022: Operating Income = $74,842M, Revenues = $282,836M   PBT Margin = (Operating Income / Revenues) * 100   PBT Margin for 2022 = (74,842 / 282,836) * 100 ≈ 26.46% - 2023: Operating Income = $84,293M, Revenues = $307,394M   PBT Margin for 2023 = (84,293 / 307,394) * 100 ≈ 27.43% The PBT margin increased from approximately 26.46% in 2022 to 27.43% in 2023. Return on Tangible Equity (ROTE): - 2022: Net Income = $59,972M, Tangible Equity (Total Stockholders' Equity - Goodwill) = $256,104M - $28,960M = $227,144M   ROTE = (Net Income / Tangible Equity) * 100   ROTE for 2022 = (59,972 / 227,144) * 100 ≈ 26.4% - 2023: Net Income = $73,795M, Tangible Equity (Total Stockholders' Equity - Goodwill) = $282,379M - $29,198M = $253,181M   ROTE for 2023 = (73,795 / 253,181) * 100 ≈ 29.15% The ROTE improved from approximately 26.4% in 2022 to 29.15% in 2023. Net Interest Margin (NIM): - 2022: Interest Income = $2,174M, Interest Expense = $357M, Average Earning Assets = $91,883M (Cash, cash equivalents, and marketable securities)   NIM = ((Interest Income - Interest Expense) / Average Earning Assets) * 100   NIM for 2022 = ((2,174 - 357) / 91,883) * 100 ≈ 1.98% - 2023: Interest Income = $3,865M, Interest Expense = $308M, Average Earning Assets = $86,868M (Cash, cash equivalents, and marketable securities)   NIM for 2023 = ((3,865 - 308) / 86,868) * 100 ≈ 4.10% The NIM increased significantly from approximately 1.98% in 2022 to 4.10% in 2023. These KPIs indicate an overall enhancement in profitability and interest management effectiveness from 2022 to 2023.</a:t>
             </a:r>
             <a:endParaRPr lang="en-GB" sz="1200" dirty="0"/>
           </a:p>
@@ -4575,6 +4479,78 @@
           </a:p>
         </p:txBody>
       </p:sp>
+      <p:pic>
+        <p:nvPicPr>
+          <p:cNvPr id="5" name="Picture 4" descr="pbt_margin.png"/>
+          <p:cNvPicPr>
+            <a:picLocks noChangeAspect="1"/>
+          </p:cNvPicPr>
+          <p:nvPr/>
+        </p:nvPicPr>
+        <p:blipFill>
+          <a:blip r:embed="rId2"/>
+          <a:stretch>
+            <a:fillRect/>
+          </a:stretch>
+        </p:blipFill>
+        <p:spPr>
+          <a:xfrm>
+            <a:off x="457200" y="914400"/>
+            <a:ext cx="4572000" cy="3429000"/>
+          </a:xfrm>
+          <a:prstGeom prst="rect">
+            <a:avLst/>
+          </a:prstGeom>
+        </p:spPr>
+      </p:pic>
+      <p:pic>
+        <p:nvPicPr>
+          <p:cNvPr id="6" name="Picture 5" descr="rote.png"/>
+          <p:cNvPicPr>
+            <a:picLocks noChangeAspect="1"/>
+          </p:cNvPicPr>
+          <p:nvPr/>
+        </p:nvPicPr>
+        <p:blipFill>
+          <a:blip r:embed="rId3"/>
+          <a:stretch>
+            <a:fillRect/>
+          </a:stretch>
+        </p:blipFill>
+        <p:spPr>
+          <a:xfrm>
+            <a:off x="4114800" y="914400"/>
+            <a:ext cx="4572000" cy="3429000"/>
+          </a:xfrm>
+          <a:prstGeom prst="rect">
+            <a:avLst/>
+          </a:prstGeom>
+        </p:spPr>
+      </p:pic>
+      <p:pic>
+        <p:nvPicPr>
+          <p:cNvPr id="7" name="Picture 6" descr="nim.png"/>
+          <p:cNvPicPr>
+            <a:picLocks noChangeAspect="1"/>
+          </p:cNvPicPr>
+          <p:nvPr/>
+        </p:nvPicPr>
+        <p:blipFill>
+          <a:blip r:embed="rId4"/>
+          <a:stretch>
+            <a:fillRect/>
+          </a:stretch>
+        </p:blipFill>
+        <p:spPr>
+          <a:xfrm>
+            <a:off x="7772400" y="4114800"/>
+            <a:ext cx="4572000" cy="3429000"/>
+          </a:xfrm>
+          <a:prstGeom prst="rect">
+            <a:avLst/>
+          </a:prstGeom>
+        </p:spPr>
+      </p:pic>
     </p:spTree>
     <p:extLst>
       <p:ext uri="{BB962C8B-B14F-4D97-AF65-F5344CB8AC3E}">

</xml_diff>

<commit_message>
updates to icons and plots
</commit_message>
<xml_diff>
--- a/fastapi-backend/pres/output.pptx
+++ b/fastapi-backend/pres/output.pptx
@@ -3972,7 +3972,7 @@
             </a:pPr>
             <a:r>
               <a:rPr sz="1200"/>
-              <a:t>The company's revenue and general profit and loss have exhibited consistent growth over the years 2021 to 2023. Here is a synthesized analysis with the key financial metrics and derived trends: 1. Revenue Growth:     - Total revenues grew from $257.6 billion in 2021 to $282.8 billion in 2022, and further to $307.4 billion in 2023. This indicates a Compound Annual Growth Rate (CAGR) of approximately 9%. 2. Revenue Distribution:    - Google Services, comprising Google Search, YouTube ads, and others, continues to dominate, accounting for roughly 89% of 2023 revenues.    - Google Cloud saw significant growth, increasing from $19.2 billion in 2021 to $33.1 billion in 2023, showcasing the importance of cloud services in the revenue mix. 3. Geographical Distribution:    - The U.S. remains the largest market, contributing 46-48% of total revenues from 2021 to 2023. EMEA and APAC are also significant, composing nearly 46% in 2023. 4. Cost and Expenses:    - Costs and expenses increased from $178.9 billion in 2021 to $223.1 billion in 2023. Major cost contributors include the cost of revenues (e.g., content acquisition, infrastructure), research and development, and sales and marketing expenses. 5. Profitability:    - Operating income fluctuated from $78.7 billion in 2021 to $74.8 billion in 2022, then rose to $84.3 billion in 2023. This improvement in 2023 is attributed to increased efficiency and the extended useful life of servers and network equipment, reducing depreciation expenses by about $3.9 billion. 6. Net Income:    - The net income showed variability, dropping from $76.0 billion in 2021 to $60.0 billion in 2022, then rising to $73.8 billion in 2023, highlighting the impact of marketable security fluctuations and operational efficiencies. Derived Trends: - The revenue growth, especially in Google Cloud, indicates a strategic pivot towards diversified services. - The significant R&amp;D spending increase suggests a strong focus on innovation and securing future revenue streams. - The geographical revenue distribution underscores the importance of global operations and the need to manage currency risks. In summary, Alphabet Inc.'s robust revenue growth, strategic investments in cloud services, and operational efficiencies ensure sustained profitability, despite fluctuations in other income and expenses.</a:t>
+              <a:t>Amazon's revenue has shown significant growth over the years across various segments and services. Key figures and trends from the period 2020 to 2022 include: 1. Consolidated Net Sales: Increased from $386.06 billion in 2020 to $513.98 billion in 2022, reflecting a compound annual growth rate (CAGR) of approximately 15.6%.     2. Revenue Segments:    - North America: Revenue grew from $236.28 billion in 2020 to $315.88 billion in 2022, indicating Amazon's strong presence and expansion in its primary market.    - International: Peaked at $127.79 billion in 2021 but declined to $118.01 billion in 2022, likely due to adverse foreign currency exchange rates and other macroeconomic challenges.    - AWS (Amazon Web Services): Demonstrated the highest growth rate, with revenue soaring from $45.37 billion in 2020 to $80.10 billion in 2022, showcasing the increasing reliance on cloud services. 3. Revenue Breakdown by Services:    - Online Stores: Consistently the largest revenue stream but relatively flat in recent years, from $222.08 billion in 2021 to $220.00 billion in 2022.    - Third-party Seller Services: Significantly increased from $80.46 billion in 2020 to $117.72 billion in 2022.    - Subscription Services: Grew from $25.21 billion in 2020 to $35.22 billion in 2022, driven by Amazon Prime and other subscription-based services.    - Advertising Services: Notably rose from $19.77 billion in 2020 to $37.74 billion in 2022, highlighting Amazon's lucrative advertising business.    - AWS: As mentioned, saw remarkable growth, underlining its critical contribution to Amazon’s overall revenue. The data clearly illustrates Amazon's diversified revenue streams, with AWS and third-party services being key growth drivers in recent years. This shift reflects an increasing dependency on cloud infrastructure and the growing dominance of Amazon's marketplace platform.</a:t>
             </a:r>
           </a:p>
         </p:txBody>
@@ -3994,7 +3994,7 @@
         <p:spPr>
           <a:xfrm>
             <a:off x="6858000" y="457200"/>
-            <a:ext cx="4572000" cy="2743200"/>
+            <a:ext cx="4572000" cy="3429000"/>
           </a:xfrm>
           <a:prstGeom prst="rect">
             <a:avLst/>
@@ -4018,7 +4018,7 @@
         <p:spPr>
           <a:xfrm>
             <a:off x="6858000" y="3657600"/>
-            <a:ext cx="4572000" cy="2743200"/>
+            <a:ext cx="4572000" cy="3429000"/>
           </a:xfrm>
           <a:prstGeom prst="rect">
             <a:avLst/>
@@ -4118,7 +4118,7 @@
             </a:pPr>
             <a:r>
               <a:rPr sz="1200"/>
-              <a:t>Operating income for Alphabet Inc. experienced notable changes from 2021 to 2023. In 2021, the total operating income was $78.714 billion, which slightly decreased to $74.842 billion in 2022 but rebounded to $84.293 billion in 2023. In terms of segment performance, Google Services consistently contributed the highest operating income: $88.132 billion in 2021, $82.699 billion in 2022, and increased to $95.858 billion in 2023. Google Cloud showed significant improvement, moving from a loss of $2.282 billion in 2021 to a smaller loss of $1.922 billion in 2022, and then turned profitable with an income of $1.716 billion in 2023. The 'Other Bets' segment, however, showed persistent losses, recording a loss of $4.636 billion in 2022 which slightly improved to a loss of $4.095 billion in 2023. These changes are influenced primarily by increases in revenues and strategic expense management across the different segments.</a:t>
+              <a:t>The operating income of the company has exhibited significant variance over the past years. In 2020, the consolidated operating income was $22.9 billion. This increased to $24.9 billion in 2021 but dropped to $12.2 billion in 2022. In 2021, the North America segment’s operating income was $7.3 billion, which then swung to a loss of $2.8 billion in 2022. The International segment also saw a notable deterioration from an operating loss of $0.9 billion in 2021 to $7.7 billion in 2022. Conversely, AWS demonstrated consistent growth, with operating income rising from $18.5 billion in 2021 to $22.8 billion in 2022. The decline in North America and International operating income in 2022 is attributed to increased fulfillment and shipping costs, investments in the fulfillment network, higher transportation costs, wage rates and incentives, and elevated technology and content expenses. However, AWS's growth was driven by increased sales and cost structure productivity, though partially offset by higher payroll and technology infrastructure spending.</a:t>
             </a:r>
             <a:endParaRPr lang="en-GB" sz="1200" dirty="0"/>
           </a:p>
@@ -4141,7 +4141,7 @@
         <p:spPr>
           <a:xfrm>
             <a:off x="6858000" y="457200"/>
-            <a:ext cx="4572000" cy="2743200"/>
+            <a:ext cx="4572000" cy="3429000"/>
           </a:xfrm>
           <a:prstGeom prst="rect">
             <a:avLst/>
@@ -4241,14 +4241,14 @@
             </a:pPr>
             <a:r>
               <a:rPr sz="1200"/>
-              <a:t>Alphabet's cash flow has shown notable changes over time: From 2021 to 2023, net cash provided by operating activities increased from $91.7 billion in 2021 to $101.7 billion in 2023. The increase in operating cash flow was primarily driven by higher cash received from customers, despite increases in cash paid for cost of revenues and operating expenses. Investing activities reflected an increasing use of cash, with net cash used in investing activities widening from $35.5 billion in 2021 to $27.1 billion in 2023. This was mainly due to increased purchases of property and equipment, though offset by reduced maturities and sales of marketable securities and payment for acquisitions. With regard to financing activities, net cash used grew from $61.4 billion in 2021 to $72.1 billion in 2023, primarily due to increased stock repurchases. Overall, Alphabet has maintained a robust cash flow, emphasizing its strong operational efficiency and strategic investments for long-term growth.</a:t>
+              <a:t>Over the years, Amazon's cash flow has experienced notable changes. Cash from operating activities was $66.1 billion in 2020, but decreased to $46.3 billion in 2021 and marginally increased to $46.8 billion in 2022. This fluctuation in operating cash flow is eventually attributable to variations in net income, which surged from $21.3 billion in 2020 to $33.4 billion in 2021, before plummeting to a net loss of $2.7 billion in 2022. Investing activities consistently reported negative cash flow, with outflows of $59.6 billion in 2020, $58.2 billion in 2021, and $37.6 billion in 2022, primarily driven by capital expenditures and acquisitions. Notably, property and equipment purchases escalated from $40.1 billion in 2020 to $63.6 billion in 2022. Financing activities show a different trend, swinging from cash outflows of $1.1 billion in 2020 to inflows of $6.3 billion in 2021 and $9.7 billion in 2022. Financing cash flow was influenced by debt proceeds and repayments alongside stock repurchases. Overall, while operational cash remained significant, Amazon intensified investments and leveraged financing activities to support its expansive infrastructure and growth initiatives.</a:t>
             </a:r>
           </a:p>
         </p:txBody>
       </p:sp>
       <p:pic>
         <p:nvPicPr>
-          <p:cNvPr id="4" name="Picture 3" descr="cash_flow_trends_over_time.png"/>
+          <p:cNvPr id="4" name="Picture 3" descr="amazon_cash_flow_analysis.png"/>
           <p:cNvPicPr>
             <a:picLocks noChangeAspect="1"/>
           </p:cNvPicPr>
@@ -4363,7 +4363,7 @@
             </a:pPr>
             <a:r>
               <a:rPr sz="1200"/>
-              <a:t>PBT Margin: - 2022: Operating Income = $74,842M, Revenues = $282,836M   PBT Margin = (Operating Income / Revenues) * 100   PBT Margin for 2022 = (74,842 / 282,836) * 100 ≈ 26.46% - 2023: Operating Income = $84,293M, Revenues = $307,394M   PBT Margin for 2023 = (84,293 / 307,394) * 100 ≈ 27.43% The PBT margin increased from approximately 26.46% in 2022 to 27.43% in 2023. Return on Tangible Equity (ROTE): - 2022: Net Income = $59,972M, Tangible Equity (Total Stockholders' Equity - Goodwill) = $256,104M - $28,960M = $227,144M   ROTE = (Net Income / Tangible Equity) * 100   ROTE for 2022 = (59,972 / 227,144) * 100 ≈ 26.4% - 2023: Net Income = $73,795M, Tangible Equity (Total Stockholders' Equity - Goodwill) = $282,379M - $29,198M = $253,181M   ROTE for 2023 = (73,795 / 253,181) * 100 ≈ 29.15% The ROTE improved from approximately 26.4% in 2022 to 29.15% in 2023. Net Interest Margin (NIM): - 2022: Interest Income = $2,174M, Interest Expense = $357M, Average Earning Assets = $91,883M (Cash, cash equivalents, and marketable securities)   NIM = ((Interest Income - Interest Expense) / Average Earning Assets) * 100   NIM for 2022 = ((2,174 - 357) / 91,883) * 100 ≈ 1.98% - 2023: Interest Income = $3,865M, Interest Expense = $308M, Average Earning Assets = $86,868M (Cash, cash equivalents, and marketable securities)   NIM for 2023 = ((3,865 - 308) / 86,868) * 100 ≈ 4.10% The NIM increased significantly from approximately 1.98% in 2022 to 4.10% in 2023. These KPIs indicate an overall enhancement in profitability and interest management effectiveness from 2022 to 2023.</a:t>
+              <a:t>KPI Analysis #PBT Margin: Profit Before Tax (PBT) for 2021 was $24.9 billion, and for 2022 it was $12.2 billion. PBT margins are calculated as follows: - 2021: PBT margin = PBT / Net Sales = 24,879 / 469,822 = 5.29% - 2022: PBT margin = PBT / Net Sales = 12,248 / 513,983 = 2.38% #Income to Cost Ratio: The income to cost ratio is calculated as Operating Income / Operating Expenses: - 2021: 24,879 / 444,943 = 0.056  - 2022: 12,248 / 501,735 = 0.024 #Net Interest Margin: Net interest margin (Interest Income - Interest Expense) / Average Earning Assets: Interest Income was not explicitly stated, but there were expenses for interest on debt and finance leases: - 2022: Interest on debt $1,561, finance leases $374, and total net interest expenses were $1,935 million. #Return on Tangible Equity (ROTE): Return on Tangible Equity is calculated as follows: (Net Income - Dividends) / Tangible Equity: - 2021: ((33,364) / (138,245 - Goodwill of $4.9B and intangibles)) = ((33,364) / (138,245 - 4,900)) = 25.8% - 2022: ((-2,722) / (146,043 - Goodwill of $9.616B and intangibles)) = ((-2,722) / (146,043 - 9,616)) = -1.97% Amazon experienced a decline in its PBT margin and income to cost ratio due to rising costs and lower operating income.</a:t>
             </a:r>
             <a:endParaRPr lang="en-GB" sz="1200" dirty="0"/>
           </a:p>
@@ -4481,7 +4481,7 @@
       </p:sp>
       <p:pic>
         <p:nvPicPr>
-          <p:cNvPr id="5" name="Picture 4" descr="pbt_margin.png"/>
+          <p:cNvPr id="5" name="Picture 4" descr="pbt_margin_trend.png"/>
           <p:cNvPicPr>
             <a:picLocks noChangeAspect="1"/>
           </p:cNvPicPr>
@@ -4496,7 +4496,7 @@
         <p:spPr>
           <a:xfrm>
             <a:off x="457200" y="914400"/>
-            <a:ext cx="4572000" cy="3429000"/>
+            <a:ext cx="4572000" cy="2743200"/>
           </a:xfrm>
           <a:prstGeom prst="rect">
             <a:avLst/>
@@ -4505,7 +4505,7 @@
       </p:pic>
       <p:pic>
         <p:nvPicPr>
-          <p:cNvPr id="6" name="Picture 5" descr="rote.png"/>
+          <p:cNvPr id="6" name="Picture 5" descr="income_to_cost_ratio_trend.png"/>
           <p:cNvPicPr>
             <a:picLocks noChangeAspect="1"/>
           </p:cNvPicPr>
@@ -4520,7 +4520,7 @@
         <p:spPr>
           <a:xfrm>
             <a:off x="4114800" y="914400"/>
-            <a:ext cx="4572000" cy="3429000"/>
+            <a:ext cx="4572000" cy="2743200"/>
           </a:xfrm>
           <a:prstGeom prst="rect">
             <a:avLst/>
@@ -4529,7 +4529,7 @@
       </p:pic>
       <p:pic>
         <p:nvPicPr>
-          <p:cNvPr id="7" name="Picture 6" descr="nim.png"/>
+          <p:cNvPr id="7" name="Picture 6" descr="return_on_tangible_equity_trend.png"/>
           <p:cNvPicPr>
             <a:picLocks noChangeAspect="1"/>
           </p:cNvPicPr>
@@ -4544,7 +4544,31 @@
         <p:spPr>
           <a:xfrm>
             <a:off x="7772400" y="4114800"/>
-            <a:ext cx="4572000" cy="3429000"/>
+            <a:ext cx="4572000" cy="2743200"/>
+          </a:xfrm>
+          <a:prstGeom prst="rect">
+            <a:avLst/>
+          </a:prstGeom>
+        </p:spPr>
+      </p:pic>
+      <p:pic>
+        <p:nvPicPr>
+          <p:cNvPr id="8" name="Picture 7" descr="net_interest_margin_trend.png"/>
+          <p:cNvPicPr>
+            <a:picLocks noChangeAspect="1"/>
+          </p:cNvPicPr>
+          <p:nvPr/>
+        </p:nvPicPr>
+        <p:blipFill>
+          <a:blip r:embed="rId5"/>
+          <a:stretch>
+            <a:fillRect/>
+          </a:stretch>
+        </p:blipFill>
+        <p:spPr>
+          <a:xfrm>
+            <a:off x="11430000" y="4114800"/>
+            <a:ext cx="4572000" cy="2743200"/>
           </a:xfrm>
           <a:prstGeom prst="rect">
             <a:avLst/>

</xml_diff>

<commit_message>
new format initial working
</commit_message>
<xml_diff>
--- a/fastapi-backend/pres/output.pptx
+++ b/fastapi-backend/pres/output.pptx
@@ -3971,60 +3971,12 @@
               <a:buNone/>
             </a:pPr>
             <a:r>
-              <a:rPr sz="1200"/>
-              <a:t>Amazon's revenue has shown significant growth over the years across various segments and services. Key figures and trends from the period 2020 to 2022 include: 1. Consolidated Net Sales: Increased from $386.06 billion in 2020 to $513.98 billion in 2022, reflecting a compound annual growth rate (CAGR) of approximately 15.6%.     2. Revenue Segments:    - North America: Revenue grew from $236.28 billion in 2020 to $315.88 billion in 2022, indicating Amazon's strong presence and expansion in its primary market.    - International: Peaked at $127.79 billion in 2021 but declined to $118.01 billion in 2022, likely due to adverse foreign currency exchange rates and other macroeconomic challenges.    - AWS (Amazon Web Services): Demonstrated the highest growth rate, with revenue soaring from $45.37 billion in 2020 to $80.10 billion in 2022, showcasing the increasing reliance on cloud services. 3. Revenue Breakdown by Services:    - Online Stores: Consistently the largest revenue stream but relatively flat in recent years, from $222.08 billion in 2021 to $220.00 billion in 2022.    - Third-party Seller Services: Significantly increased from $80.46 billion in 2020 to $117.72 billion in 2022.    - Subscription Services: Grew from $25.21 billion in 2020 to $35.22 billion in 2022, driven by Amazon Prime and other subscription-based services.    - Advertising Services: Notably rose from $19.77 billion in 2020 to $37.74 billion in 2022, highlighting Amazon's lucrative advertising business.    - AWS: As mentioned, saw remarkable growth, underlining its critical contribution to Amazon’s overall revenue. The data clearly illustrates Amazon's diversified revenue streams, with AWS and third-party services being key growth drivers in recent years. This shift reflects an increasing dependency on cloud infrastructure and the growing dominance of Amazon's marketplace platform.</a:t>
-            </a:r>
-          </a:p>
-        </p:txBody>
-      </p:sp>
-      <p:pic>
-        <p:nvPicPr>
-          <p:cNvPr id="4" name="Picture 3" descr="total_revenue.png"/>
-          <p:cNvPicPr>
-            <a:picLocks noChangeAspect="1"/>
-          </p:cNvPicPr>
-          <p:nvPr/>
-        </p:nvPicPr>
-        <p:blipFill>
-          <a:blip r:embed="rId2"/>
-          <a:stretch>
-            <a:fillRect/>
-          </a:stretch>
-        </p:blipFill>
-        <p:spPr>
-          <a:xfrm>
-            <a:off x="6858000" y="457200"/>
-            <a:ext cx="4572000" cy="3429000"/>
-          </a:xfrm>
-          <a:prstGeom prst="rect">
-            <a:avLst/>
-          </a:prstGeom>
-        </p:spPr>
-      </p:pic>
-      <p:pic>
-        <p:nvPicPr>
-          <p:cNvPr id="5" name="Picture 4" descr="revenue_by_segment.png"/>
-          <p:cNvPicPr>
-            <a:picLocks noChangeAspect="1"/>
-          </p:cNvPicPr>
-          <p:nvPr/>
-        </p:nvPicPr>
-        <p:blipFill>
-          <a:blip r:embed="rId3"/>
-          <a:stretch>
-            <a:fillRect/>
-          </a:stretch>
-        </p:blipFill>
-        <p:spPr>
-          <a:xfrm>
-            <a:off x="6858000" y="3657600"/>
-            <a:ext cx="4572000" cy="3429000"/>
-          </a:xfrm>
-          <a:prstGeom prst="rect">
-            <a:avLst/>
-          </a:prstGeom>
-        </p:spPr>
-      </p:pic>
+              <a:rPr lang="en-GB" sz="1200" dirty="0"/>
+              <a:t>revenue</a:t>
+            </a:r>
+          </a:p>
+        </p:txBody>
+      </p:sp>
     </p:spTree>
     <p:extLst>
       <p:ext uri="{BB962C8B-B14F-4D97-AF65-F5344CB8AC3E}">
@@ -4117,37 +4069,13 @@
               <a:buNone/>
             </a:pPr>
             <a:r>
-              <a:rPr sz="1200"/>
-              <a:t>The operating income of the company has exhibited significant variance over the past years. In 2020, the consolidated operating income was $22.9 billion. This increased to $24.9 billion in 2021 but dropped to $12.2 billion in 2022. In 2021, the North America segment’s operating income was $7.3 billion, which then swung to a loss of $2.8 billion in 2022. The International segment also saw a notable deterioration from an operating loss of $0.9 billion in 2021 to $7.7 billion in 2022. Conversely, AWS demonstrated consistent growth, with operating income rising from $18.5 billion in 2021 to $22.8 billion in 2022. The decline in North America and International operating income in 2022 is attributed to increased fulfillment and shipping costs, investments in the fulfillment network, higher transportation costs, wage rates and incentives, and elevated technology and content expenses. However, AWS's growth was driven by increased sales and cost structure productivity, though partially offset by higher payroll and technology infrastructure spending.</a:t>
+              <a:rPr lang="en-GB" sz="1200" dirty="0" err="1"/>
+              <a:t>operatingincome</a:t>
             </a:r>
             <a:endParaRPr lang="en-GB" sz="1200" dirty="0"/>
           </a:p>
         </p:txBody>
       </p:sp>
-      <p:pic>
-        <p:nvPicPr>
-          <p:cNvPr id="4" name="Picture 3" descr="operating_income_trends.png"/>
-          <p:cNvPicPr>
-            <a:picLocks noChangeAspect="1"/>
-          </p:cNvPicPr>
-          <p:nvPr/>
-        </p:nvPicPr>
-        <p:blipFill>
-          <a:blip r:embed="rId2"/>
-          <a:stretch>
-            <a:fillRect/>
-          </a:stretch>
-        </p:blipFill>
-        <p:spPr>
-          <a:xfrm>
-            <a:off x="6858000" y="457200"/>
-            <a:ext cx="4572000" cy="3429000"/>
-          </a:xfrm>
-          <a:prstGeom prst="rect">
-            <a:avLst/>
-          </a:prstGeom>
-        </p:spPr>
-      </p:pic>
     </p:spTree>
     <p:extLst>
       <p:ext uri="{BB962C8B-B14F-4D97-AF65-F5344CB8AC3E}">
@@ -4241,14 +4169,14 @@
             </a:pPr>
             <a:r>
               <a:rPr sz="1200"/>
-              <a:t>Over the years, Amazon's cash flow has experienced notable changes. Cash from operating activities was $66.1 billion in 2020, but decreased to $46.3 billion in 2021 and marginally increased to $46.8 billion in 2022. This fluctuation in operating cash flow is eventually attributable to variations in net income, which surged from $21.3 billion in 2020 to $33.4 billion in 2021, before plummeting to a net loss of $2.7 billion in 2022. Investing activities consistently reported negative cash flow, with outflows of $59.6 billion in 2020, $58.2 billion in 2021, and $37.6 billion in 2022, primarily driven by capital expenditures and acquisitions. Notably, property and equipment purchases escalated from $40.1 billion in 2020 to $63.6 billion in 2022. Financing activities show a different trend, swinging from cash outflows of $1.1 billion in 2020 to inflows of $6.3 billion in 2021 and $9.7 billion in 2022. Financing cash flow was influenced by debt proceeds and repayments alongside stock repurchases. Overall, while operational cash remained significant, Amazon intensified investments and leveraged financing activities to support its expansive infrastructure and growth initiatives.</a:t>
+              <a:t>The cash flow of Amazon has undergone significant changes over the past three years.  1. Operating Activities: It saw a net cash provided of $66.1 billion in 2020, which decreased to $46.3 billion in 2021 and stabilized at $46.8 billion in 2022. The slight increase in 2022 was primarily due to higher net income adjustments excluding non-cash expenses, offset by working capital changes. 2. Investing Activities: Net cash used in investing activities was $(59.6) billion, $(58.2) billion, and $(37.6) billion in 2020, 2021, and 2022, respectively. The fluctuations were mainly due to variations in purchases, sales, and maturities of marketable securities, and increased spending on technology infrastructure and acquisitions. 3. Financing Activities: Cash provided by financing activities was $(1.1) billion in 2020, which increased to $6.3 billion in 2021 and $9.7 billion in 2022. This growth was driven by increased proceeds from short-term and long-term debt and stock repurchases, despite higher repayments of debt and finance leases. Overall, Amazon’s cash flow has been influenced by its investments in technology and infrastructure, debt management, and strategic acquisitions, reflecting its focus on long-term growth despite short-term variabilities.</a:t>
             </a:r>
           </a:p>
         </p:txBody>
       </p:sp>
       <p:pic>
         <p:nvPicPr>
-          <p:cNvPr id="4" name="Picture 3" descr="amazon_cash_flow_analysis.png"/>
+          <p:cNvPr id="4" name="Picture 3" descr="cashflow_1.png"/>
           <p:cNvPicPr>
             <a:picLocks noChangeAspect="1"/>
           </p:cNvPicPr>
@@ -4263,6 +4191,54 @@
         <p:spPr>
           <a:xfrm>
             <a:off x="6858000" y="457200"/>
+            <a:ext cx="4572000" cy="2743200"/>
+          </a:xfrm>
+          <a:prstGeom prst="rect">
+            <a:avLst/>
+          </a:prstGeom>
+        </p:spPr>
+      </p:pic>
+      <p:pic>
+        <p:nvPicPr>
+          <p:cNvPr id="5" name="Picture 4" descr="cashflow_3.png"/>
+          <p:cNvPicPr>
+            <a:picLocks noChangeAspect="1"/>
+          </p:cNvPicPr>
+          <p:nvPr/>
+        </p:nvPicPr>
+        <p:blipFill>
+          <a:blip r:embed="rId3"/>
+          <a:stretch>
+            <a:fillRect/>
+          </a:stretch>
+        </p:blipFill>
+        <p:spPr>
+          <a:xfrm>
+            <a:off x="6858000" y="3657600"/>
+            <a:ext cx="4572000" cy="2743200"/>
+          </a:xfrm>
+          <a:prstGeom prst="rect">
+            <a:avLst/>
+          </a:prstGeom>
+        </p:spPr>
+      </p:pic>
+      <p:pic>
+        <p:nvPicPr>
+          <p:cNvPr id="6" name="Picture 5" descr="cashflow_2.png"/>
+          <p:cNvPicPr>
+            <a:picLocks noChangeAspect="1"/>
+          </p:cNvPicPr>
+          <p:nvPr/>
+        </p:nvPicPr>
+        <p:blipFill>
+          <a:blip r:embed="rId4"/>
+          <a:stretch>
+            <a:fillRect/>
+          </a:stretch>
+        </p:blipFill>
+        <p:spPr>
+          <a:xfrm>
+            <a:off x="6858000" y="6858000"/>
             <a:ext cx="4572000" cy="2743200"/>
           </a:xfrm>
           <a:prstGeom prst="rect">
@@ -4362,8 +4338,8 @@
               <a:buNone/>
             </a:pPr>
             <a:r>
-              <a:rPr sz="1200"/>
-              <a:t>KPI Analysis #PBT Margin: Profit Before Tax (PBT) for 2021 was $24.9 billion, and for 2022 it was $12.2 billion. PBT margins are calculated as follows: - 2021: PBT margin = PBT / Net Sales = 24,879 / 469,822 = 5.29% - 2022: PBT margin = PBT / Net Sales = 12,248 / 513,983 = 2.38% #Income to Cost Ratio: The income to cost ratio is calculated as Operating Income / Operating Expenses: - 2021: 24,879 / 444,943 = 0.056  - 2022: 12,248 / 501,735 = 0.024 #Net Interest Margin: Net interest margin (Interest Income - Interest Expense) / Average Earning Assets: Interest Income was not explicitly stated, but there were expenses for interest on debt and finance leases: - 2022: Interest on debt $1,561, finance leases $374, and total net interest expenses were $1,935 million. #Return on Tangible Equity (ROTE): Return on Tangible Equity is calculated as follows: (Net Income - Dividends) / Tangible Equity: - 2021: ((33,364) / (138,245 - Goodwill of $4.9B and intangibles)) = ((33,364) / (138,245 - 4,900)) = 25.8% - 2022: ((-2,722) / (146,043 - Goodwill of $9.616B and intangibles)) = ((-2,722) / (146,043 - 9,616)) = -1.97% Amazon experienced a decline in its PBT margin and income to cost ratio due to rising costs and lower operating income.</a:t>
+              <a:rPr lang="en-GB" sz="1200" dirty="0" err="1"/>
+              <a:t>kpis</a:t>
             </a:r>
             <a:endParaRPr lang="en-GB" sz="1200" dirty="0"/>
           </a:p>
@@ -4479,102 +4455,6 @@
           </a:p>
         </p:txBody>
       </p:sp>
-      <p:pic>
-        <p:nvPicPr>
-          <p:cNvPr id="5" name="Picture 4" descr="pbt_margin_trend.png"/>
-          <p:cNvPicPr>
-            <a:picLocks noChangeAspect="1"/>
-          </p:cNvPicPr>
-          <p:nvPr/>
-        </p:nvPicPr>
-        <p:blipFill>
-          <a:blip r:embed="rId2"/>
-          <a:stretch>
-            <a:fillRect/>
-          </a:stretch>
-        </p:blipFill>
-        <p:spPr>
-          <a:xfrm>
-            <a:off x="457200" y="914400"/>
-            <a:ext cx="4572000" cy="2743200"/>
-          </a:xfrm>
-          <a:prstGeom prst="rect">
-            <a:avLst/>
-          </a:prstGeom>
-        </p:spPr>
-      </p:pic>
-      <p:pic>
-        <p:nvPicPr>
-          <p:cNvPr id="6" name="Picture 5" descr="income_to_cost_ratio_trend.png"/>
-          <p:cNvPicPr>
-            <a:picLocks noChangeAspect="1"/>
-          </p:cNvPicPr>
-          <p:nvPr/>
-        </p:nvPicPr>
-        <p:blipFill>
-          <a:blip r:embed="rId3"/>
-          <a:stretch>
-            <a:fillRect/>
-          </a:stretch>
-        </p:blipFill>
-        <p:spPr>
-          <a:xfrm>
-            <a:off x="4114800" y="914400"/>
-            <a:ext cx="4572000" cy="2743200"/>
-          </a:xfrm>
-          <a:prstGeom prst="rect">
-            <a:avLst/>
-          </a:prstGeom>
-        </p:spPr>
-      </p:pic>
-      <p:pic>
-        <p:nvPicPr>
-          <p:cNvPr id="7" name="Picture 6" descr="return_on_tangible_equity_trend.png"/>
-          <p:cNvPicPr>
-            <a:picLocks noChangeAspect="1"/>
-          </p:cNvPicPr>
-          <p:nvPr/>
-        </p:nvPicPr>
-        <p:blipFill>
-          <a:blip r:embed="rId4"/>
-          <a:stretch>
-            <a:fillRect/>
-          </a:stretch>
-        </p:blipFill>
-        <p:spPr>
-          <a:xfrm>
-            <a:off x="7772400" y="4114800"/>
-            <a:ext cx="4572000" cy="2743200"/>
-          </a:xfrm>
-          <a:prstGeom prst="rect">
-            <a:avLst/>
-          </a:prstGeom>
-        </p:spPr>
-      </p:pic>
-      <p:pic>
-        <p:nvPicPr>
-          <p:cNvPr id="8" name="Picture 7" descr="net_interest_margin_trend.png"/>
-          <p:cNvPicPr>
-            <a:picLocks noChangeAspect="1"/>
-          </p:cNvPicPr>
-          <p:nvPr/>
-        </p:nvPicPr>
-        <p:blipFill>
-          <a:blip r:embed="rId5"/>
-          <a:stretch>
-            <a:fillRect/>
-          </a:stretch>
-        </p:blipFill>
-        <p:spPr>
-          <a:xfrm>
-            <a:off x="11430000" y="4114800"/>
-            <a:ext cx="4572000" cy="2743200"/>
-          </a:xfrm>
-          <a:prstGeom prst="rect">
-            <a:avLst/>
-          </a:prstGeom>
-        </p:spPr>
-      </p:pic>
     </p:spTree>
     <p:extLst>
       <p:ext uri="{BB962C8B-B14F-4D97-AF65-F5344CB8AC3E}">

</xml_diff>

<commit_message>
test for missing env
</commit_message>
<xml_diff>
--- a/fastapi-backend/pres/output.pptx
+++ b/fastapi-backend/pres/output.pptx
@@ -8,12 +8,6 @@
     <p:sldId id="256" r:id="rId2"/>
     <p:sldId id="257" r:id="rId7"/>
     <p:sldId id="258" r:id="rId8"/>
-    <p:sldId id="259" r:id="rId9"/>
-    <p:sldId id="260" r:id="rId10"/>
-    <p:sldId id="261" r:id="rId11"/>
-    <p:sldId id="262" r:id="rId12"/>
-    <p:sldId id="263" r:id="rId13"/>
-    <p:sldId id="264" r:id="rId14"/>
   </p:sldIdLst>
   <p:sldSz cx="12192000" cy="6858000"/>
   <p:notesSz cx="6858000" cy="9144000"/>
@@ -3921,7 +3915,7 @@
           <a:lstStyle/>
           <a:p>
             <a:r>
-              <a:t>businessoverview</a:t>
+              <a:t>{"body": "Test Item"}</a:t>
             </a:r>
           </a:p>
         </p:txBody>
@@ -3942,7 +3936,7 @@
           <a:lstStyle/>
           <a:p>
             <a:r>
-              <a:t>Amazon's business overview has seen significant changes over time, evolving from a books-only retailer in 1996 with $15 million in revenue to a global giant selling almost every physical and digital retail item imaginable with a vibrant third-party seller ecosystem. By 2022, Amazon's international consumer segment drove $118 billion of revenue, showcasing a 30% compound annual growth rate in the UK, 26% in Germany, and 21% in Japan from 2019 to 2021.  Amazon's business expansion includes the introduction of Amazon Web Services (AWS) in 2006, which has grown into an $85 billion annual revenue business. In recent years, Amazon ventured into new market segments like grocery, healthcare, and advertising. Their grocery business, nearly 20 years in the making, focuses on larger pack sizes and offerings via Whole Foods Market and Amazon Fresh. Amazon Business, launched in 2015, now drives $35 billion in annualized gross sales. Additionally, their advertising segment grew by 25% YoY in 2022, reaching $31 billion in revenue. This broad diversification reflects Amazon's dynamic strategy to leverage market opportunities and innovations developed over time.</a:t>
+              <a:t>Please provide the financial documents that contain information about the "Test Item" of the company, so I can analyze how it has changed over time. You can upload the documents here.</a:t>
             </a:r>
           </a:p>
         </p:txBody>
@@ -3981,7 +3975,7 @@
           <a:lstStyle/>
           <a:p>
             <a:r>
-              <a:t>revenue</a:t>
+              <a:t>{"body": "Test Item"}</a:t>
             </a:r>
           </a:p>
         </p:txBody>
@@ -4002,643 +3996,11 @@
           <a:lstStyle/>
           <a:p>
             <a:r>
-              <a:t>Amazon's revenue has shown significant growth over the past few years. In 2020, the company reported net sales of $386.064 billion, which increased to $469.822 billion in 2021, representing a 22% year-over-year growth. In 2022, net sales reached $513.983 billion, marking a 9% increase from 2021.  The growth in revenue can be attributed to various segments. North America saw sales increase from $279.833 billion in 2021 to $315.880 billion in 2022, a 13% growth. AWS (Amazon Web Services) also contributed significantly with sales growing from $62.202 billion in 2021 to $80.096 billion in 2022, a 29% increase. However, the International segment experienced a decline in sales from $127.787 billion in 2021 to $118.007 billion in 2022, an 8% decrease, negatively impacted by changes in foreign currency exchange rates.</a:t>
-            </a:r>
-          </a:p>
-        </p:txBody>
-      </p:sp>
-    </p:spTree>
-  </p:cSld>
-  <p:clrMapOvr>
-    <a:masterClrMapping/>
-  </p:clrMapOvr>
-</p:sld>
-</file>
-
-<file path=ppt/slides/slide4.xml><?xml version="1.0" encoding="utf-8"?>
-<p:sld xmlns:a="http://schemas.openxmlformats.org/drawingml/2006/main" xmlns:p="http://schemas.openxmlformats.org/presentationml/2006/main" xmlns:r="http://schemas.openxmlformats.org/officeDocument/2006/relationships">
-  <p:cSld>
-    <p:spTree>
-      <p:nvGrpSpPr>
-        <p:cNvPr id="1" name=""/>
-        <p:cNvGrpSpPr/>
-        <p:nvPr/>
-      </p:nvGrpSpPr>
-      <p:grpSpPr/>
-      <p:sp>
-        <p:nvSpPr>
-          <p:cNvPr id="2" name="Title 1"/>
-          <p:cNvSpPr>
-            <a:spLocks noGrp="1"/>
-          </p:cNvSpPr>
-          <p:nvPr>
-            <p:ph type="title"/>
-          </p:nvPr>
-        </p:nvSpPr>
-        <p:spPr/>
-        <p:txBody>
-          <a:bodyPr/>
-          <a:lstStyle/>
-          <a:p>
-            <a:r>
-              <a:t>operatingincome</a:t>
-            </a:r>
-          </a:p>
-        </p:txBody>
-      </p:sp>
-      <p:sp>
-        <p:nvSpPr>
-          <p:cNvPr id="3" name="Content Placeholder 2"/>
-          <p:cNvSpPr>
-            <a:spLocks noGrp="1"/>
-          </p:cNvSpPr>
-          <p:nvPr>
-            <p:ph idx="1"/>
-          </p:nvPr>
-        </p:nvSpPr>
-        <p:spPr/>
-        <p:txBody>
-          <a:bodyPr wrap="square"/>
-          <a:lstStyle/>
-          <a:p>
-            <a:r>
-              <a:t>Amazon's operating income has displayed volatility over the recent years. In 2020, the company reported an operating income of $22.9 billion. It increased slightly in 2021 to $24.9 billion. However, in 2022, the operating income dropped significantly to $12.2 billion, primarily due to increased operating expenses related to fulfillment, shipping, technology, and content costs across its various segments. The North America segment, which had an operating income of $7.3 billion in 2021, reported a loss of $2.8 billion in 2022. The International segment continued to struggle, increasing its operating loss from $0.9 billion in 2021 to $7.7 billion in 2022. Contrarily, AWS's operating income rose from $18.5 billion in 2021 to $22.8 billion in 2022, boosted by sales growth and cost structure productivity. Overall, the downturn in 2022 illustrates pressures from rising costs offsetting gains in specific segments.</a:t>
-            </a:r>
-          </a:p>
-        </p:txBody>
-      </p:sp>
-    </p:spTree>
-  </p:cSld>
-  <p:clrMapOvr>
-    <a:masterClrMapping/>
-  </p:clrMapOvr>
-</p:sld>
-</file>
-
-<file path=ppt/slides/slide5.xml><?xml version="1.0" encoding="utf-8"?>
-<p:sld xmlns:a="http://schemas.openxmlformats.org/drawingml/2006/main" xmlns:p="http://schemas.openxmlformats.org/presentationml/2006/main" xmlns:r="http://schemas.openxmlformats.org/officeDocument/2006/relationships">
-  <p:cSld>
-    <p:spTree>
-      <p:nvGrpSpPr>
-        <p:cNvPr id="1" name=""/>
-        <p:cNvGrpSpPr/>
-        <p:nvPr/>
-      </p:nvGrpSpPr>
-      <p:grpSpPr/>
-      <p:sp>
-        <p:nvSpPr>
-          <p:cNvPr id="2" name="Title 1"/>
-          <p:cNvSpPr>
-            <a:spLocks noGrp="1"/>
-          </p:cNvSpPr>
-          <p:nvPr>
-            <p:ph type="title"/>
-          </p:nvPr>
-        </p:nvSpPr>
-        <p:spPr/>
-        <p:txBody>
-          <a:bodyPr/>
-          <a:lstStyle/>
-          <a:p>
-            <a:r>
-              <a:t>cashflow</a:t>
-            </a:r>
-          </a:p>
-        </p:txBody>
-      </p:sp>
-      <p:sp>
-        <p:nvSpPr>
-          <p:cNvPr id="3" name="Content Placeholder 2"/>
-          <p:cNvSpPr>
-            <a:spLocks noGrp="1"/>
-          </p:cNvSpPr>
-          <p:nvPr>
-            <p:ph idx="1"/>
-          </p:nvPr>
-        </p:nvSpPr>
-        <p:spPr/>
-        <p:txBody>
-          <a:bodyPr wrap="square"/>
-          <a:lstStyle/>
-          <a:p>
-            <a:r>
-              <a:t>Amazon's cash flow over the past few years shows significant fluctuations and priorities in investments and financing activities. In 2020, the net cash provided by operating activities was $66.1 billion, reduced to $46.3 billion in 2021 and slightly increased to $46.8 billion in 2022. This reduction after 2020 was driven by changes in net income, including increased depreciation, amortization, and stock-based compensation, offset by significant increases and changes in accounts receivable and payable. Cash used in investing activities varied significantly. In 2020, net cash used was $59.6 billion, which slightly decreased to $58.2 billion in 2021 and then significantly decreased to $37.6 billion in 2022. These were primarily driven by purchases of property and equipment, sales, and maturities of marketable securities. Net cash provided by financing activities fluctuated as well. In 2020, it was -$1.1 billion, jumping to $6.3 billion in 2021 and further increasing to $9.7 billion in 2022, driven by proceeds and repayments from debt and lease obligations. Overall, while operating cash flow has stabilized post-2020, the company has significantly adjusted its investment and financing strategies, reflecting changes in market conditions and strategic priorities.</a:t>
-            </a:r>
-          </a:p>
-        </p:txBody>
-      </p:sp>
-    </p:spTree>
-  </p:cSld>
-  <p:clrMapOvr>
-    <a:masterClrMapping/>
-  </p:clrMapOvr>
-</p:sld>
-</file>
-
-<file path=ppt/slides/slide6.xml><?xml version="1.0" encoding="utf-8"?>
-<p:sld xmlns:a="http://schemas.openxmlformats.org/drawingml/2006/main" xmlns:p="http://schemas.openxmlformats.org/presentationml/2006/main" xmlns:r="http://schemas.openxmlformats.org/officeDocument/2006/relationships">
-  <p:cSld>
-    <p:spTree>
-      <p:nvGrpSpPr>
-        <p:cNvPr id="1" name=""/>
-        <p:cNvGrpSpPr/>
-        <p:nvPr/>
-      </p:nvGrpSpPr>
-      <p:grpSpPr/>
-      <p:sp>
-        <p:nvSpPr>
-          <p:cNvPr id="2" name="Title 1"/>
-          <p:cNvSpPr>
-            <a:spLocks noGrp="1"/>
-          </p:cNvSpPr>
-          <p:nvPr>
-            <p:ph type="title"/>
-          </p:nvPr>
-        </p:nvSpPr>
-        <p:spPr/>
-        <p:txBody>
-          <a:bodyPr/>
-          <a:lstStyle/>
-          <a:p>
-            <a:r>
-              <a:t>businessoverview figures</a:t>
-            </a:r>
-          </a:p>
-        </p:txBody>
-      </p:sp>
-      <p:sp>
-        <p:nvSpPr>
-          <p:cNvPr id="3" name="Content Placeholder 2"/>
-          <p:cNvSpPr>
-            <a:spLocks noGrp="1"/>
-          </p:cNvSpPr>
-          <p:nvPr>
-            <p:ph idx="1"/>
-          </p:nvPr>
-        </p:nvSpPr>
-        <p:spPr/>
-        <p:txBody>
-          <a:bodyPr/>
-          <a:lstStyle/>
-          <a:p/>
-        </p:txBody>
-      </p:sp>
-      <p:pic>
-        <p:nvPicPr>
-          <p:cNvPr id="4" name="Picture 3" descr="businessoverview_2.png"/>
-          <p:cNvPicPr>
-            <a:picLocks noChangeAspect="1"/>
-          </p:cNvPicPr>
-          <p:nvPr/>
-        </p:nvPicPr>
-        <p:blipFill>
-          <a:blip r:embed="rId2"/>
-          <a:stretch>
-            <a:fillRect/>
-          </a:stretch>
-        </p:blipFill>
-        <p:spPr>
-          <a:xfrm>
-            <a:off x="822960" y="1371600"/>
-            <a:ext cx="4572000" cy="2743200"/>
-          </a:xfrm>
-          <a:prstGeom prst="rect">
-            <a:avLst/>
-          </a:prstGeom>
-        </p:spPr>
-      </p:pic>
-      <p:pic>
-        <p:nvPicPr>
-          <p:cNvPr id="5" name="Picture 4" descr="businessoverview_3.png"/>
-          <p:cNvPicPr>
-            <a:picLocks noChangeAspect="1"/>
-          </p:cNvPicPr>
-          <p:nvPr/>
-        </p:nvPicPr>
-        <p:blipFill>
-          <a:blip r:embed="rId3"/>
-          <a:stretch>
-            <a:fillRect/>
-          </a:stretch>
-        </p:blipFill>
-        <p:spPr>
-          <a:xfrm>
-            <a:off x="4480560" y="1371600"/>
-            <a:ext cx="4572000" cy="2743200"/>
-          </a:xfrm>
-          <a:prstGeom prst="rect">
-            <a:avLst/>
-          </a:prstGeom>
-        </p:spPr>
-      </p:pic>
-      <p:pic>
-        <p:nvPicPr>
-          <p:cNvPr id="6" name="Picture 5" descr="businessoverview_1.png"/>
-          <p:cNvPicPr>
-            <a:picLocks noChangeAspect="1"/>
-          </p:cNvPicPr>
-          <p:nvPr/>
-        </p:nvPicPr>
-        <p:blipFill>
-          <a:blip r:embed="rId4"/>
-          <a:stretch>
-            <a:fillRect/>
-          </a:stretch>
-        </p:blipFill>
-        <p:spPr>
-          <a:xfrm>
-            <a:off x="822960" y="4114800"/>
-            <a:ext cx="4572000" cy="2743200"/>
-          </a:xfrm>
-          <a:prstGeom prst="rect">
-            <a:avLst/>
-          </a:prstGeom>
-        </p:spPr>
-      </p:pic>
-    </p:spTree>
-  </p:cSld>
-  <p:clrMapOvr>
-    <a:masterClrMapping/>
-  </p:clrMapOvr>
-</p:sld>
-</file>
-
-<file path=ppt/slides/slide7.xml><?xml version="1.0" encoding="utf-8"?>
-<p:sld xmlns:a="http://schemas.openxmlformats.org/drawingml/2006/main" xmlns:p="http://schemas.openxmlformats.org/presentationml/2006/main" xmlns:r="http://schemas.openxmlformats.org/officeDocument/2006/relationships">
-  <p:cSld>
-    <p:spTree>
-      <p:nvGrpSpPr>
-        <p:cNvPr id="1" name=""/>
-        <p:cNvGrpSpPr/>
-        <p:nvPr/>
-      </p:nvGrpSpPr>
-      <p:grpSpPr/>
-      <p:sp>
-        <p:nvSpPr>
-          <p:cNvPr id="2" name="Title 1"/>
-          <p:cNvSpPr>
-            <a:spLocks noGrp="1"/>
-          </p:cNvSpPr>
-          <p:nvPr>
-            <p:ph type="title"/>
-          </p:nvPr>
-        </p:nvSpPr>
-        <p:spPr/>
-        <p:txBody>
-          <a:bodyPr/>
-          <a:lstStyle/>
-          <a:p>
-            <a:r>
-              <a:t>revenue figures</a:t>
-            </a:r>
-          </a:p>
-        </p:txBody>
-      </p:sp>
-      <p:sp>
-        <p:nvSpPr>
-          <p:cNvPr id="3" name="Content Placeholder 2"/>
-          <p:cNvSpPr>
-            <a:spLocks noGrp="1"/>
-          </p:cNvSpPr>
-          <p:nvPr>
-            <p:ph idx="1"/>
-          </p:nvPr>
-        </p:nvSpPr>
-        <p:spPr/>
-        <p:txBody>
-          <a:bodyPr/>
-          <a:lstStyle/>
-          <a:p/>
-        </p:txBody>
-      </p:sp>
-      <p:pic>
-        <p:nvPicPr>
-          <p:cNvPr id="4" name="Picture 3" descr="revenue_3.png"/>
-          <p:cNvPicPr>
-            <a:picLocks noChangeAspect="1"/>
-          </p:cNvPicPr>
-          <p:nvPr/>
-        </p:nvPicPr>
-        <p:blipFill>
-          <a:blip r:embed="rId2"/>
-          <a:stretch>
-            <a:fillRect/>
-          </a:stretch>
-        </p:blipFill>
-        <p:spPr>
-          <a:xfrm>
-            <a:off x="822960" y="1371600"/>
-            <a:ext cx="4572000" cy="2743200"/>
-          </a:xfrm>
-          <a:prstGeom prst="rect">
-            <a:avLst/>
-          </a:prstGeom>
-        </p:spPr>
-      </p:pic>
-      <p:pic>
-        <p:nvPicPr>
-          <p:cNvPr id="5" name="Picture 4" descr="revenue_2.png"/>
-          <p:cNvPicPr>
-            <a:picLocks noChangeAspect="1"/>
-          </p:cNvPicPr>
-          <p:nvPr/>
-        </p:nvPicPr>
-        <p:blipFill>
-          <a:blip r:embed="rId3"/>
-          <a:stretch>
-            <a:fillRect/>
-          </a:stretch>
-        </p:blipFill>
-        <p:spPr>
-          <a:xfrm>
-            <a:off x="4480560" y="1371600"/>
-            <a:ext cx="4572000" cy="2743200"/>
-          </a:xfrm>
-          <a:prstGeom prst="rect">
-            <a:avLst/>
-          </a:prstGeom>
-        </p:spPr>
-      </p:pic>
-      <p:pic>
-        <p:nvPicPr>
-          <p:cNvPr id="6" name="Picture 5" descr="revenue_1.png"/>
-          <p:cNvPicPr>
-            <a:picLocks noChangeAspect="1"/>
-          </p:cNvPicPr>
-          <p:nvPr/>
-        </p:nvPicPr>
-        <p:blipFill>
-          <a:blip r:embed="rId4"/>
-          <a:stretch>
-            <a:fillRect/>
-          </a:stretch>
-        </p:blipFill>
-        <p:spPr>
-          <a:xfrm>
-            <a:off x="822960" y="4114800"/>
-            <a:ext cx="4572000" cy="2743200"/>
-          </a:xfrm>
-          <a:prstGeom prst="rect">
-            <a:avLst/>
-          </a:prstGeom>
-        </p:spPr>
-      </p:pic>
-    </p:spTree>
-  </p:cSld>
-  <p:clrMapOvr>
-    <a:masterClrMapping/>
-  </p:clrMapOvr>
-</p:sld>
-</file>
-
-<file path=ppt/slides/slide8.xml><?xml version="1.0" encoding="utf-8"?>
-<p:sld xmlns:a="http://schemas.openxmlformats.org/drawingml/2006/main" xmlns:p="http://schemas.openxmlformats.org/presentationml/2006/main" xmlns:r="http://schemas.openxmlformats.org/officeDocument/2006/relationships">
-  <p:cSld>
-    <p:spTree>
-      <p:nvGrpSpPr>
-        <p:cNvPr id="1" name=""/>
-        <p:cNvGrpSpPr/>
-        <p:nvPr/>
-      </p:nvGrpSpPr>
-      <p:grpSpPr/>
-      <p:sp>
-        <p:nvSpPr>
-          <p:cNvPr id="2" name="Title 1"/>
-          <p:cNvSpPr>
-            <a:spLocks noGrp="1"/>
-          </p:cNvSpPr>
-          <p:nvPr>
-            <p:ph type="title"/>
-          </p:nvPr>
-        </p:nvSpPr>
-        <p:spPr/>
-        <p:txBody>
-          <a:bodyPr/>
-          <a:lstStyle/>
-          <a:p>
-            <a:r>
-              <a:t>operatingincome figures</a:t>
-            </a:r>
-          </a:p>
-        </p:txBody>
-      </p:sp>
-      <p:sp>
-        <p:nvSpPr>
-          <p:cNvPr id="3" name="Content Placeholder 2"/>
-          <p:cNvSpPr>
-            <a:spLocks noGrp="1"/>
-          </p:cNvSpPr>
-          <p:nvPr>
-            <p:ph idx="1"/>
-          </p:nvPr>
-        </p:nvSpPr>
-        <p:spPr/>
-        <p:txBody>
-          <a:bodyPr/>
-          <a:lstStyle/>
-          <a:p/>
-        </p:txBody>
-      </p:sp>
-      <p:pic>
-        <p:nvPicPr>
-          <p:cNvPr id="4" name="Picture 3" descr="operatingincome_3.png"/>
-          <p:cNvPicPr>
-            <a:picLocks noChangeAspect="1"/>
-          </p:cNvPicPr>
-          <p:nvPr/>
-        </p:nvPicPr>
-        <p:blipFill>
-          <a:blip r:embed="rId2"/>
-          <a:stretch>
-            <a:fillRect/>
-          </a:stretch>
-        </p:blipFill>
-        <p:spPr>
-          <a:xfrm>
-            <a:off x="822960" y="1371600"/>
-            <a:ext cx="4572000" cy="2743200"/>
-          </a:xfrm>
-          <a:prstGeom prst="rect">
-            <a:avLst/>
-          </a:prstGeom>
-        </p:spPr>
-      </p:pic>
-      <p:pic>
-        <p:nvPicPr>
-          <p:cNvPr id="5" name="Picture 4" descr="operatingincome_2.png"/>
-          <p:cNvPicPr>
-            <a:picLocks noChangeAspect="1"/>
-          </p:cNvPicPr>
-          <p:nvPr/>
-        </p:nvPicPr>
-        <p:blipFill>
-          <a:blip r:embed="rId3"/>
-          <a:stretch>
-            <a:fillRect/>
-          </a:stretch>
-        </p:blipFill>
-        <p:spPr>
-          <a:xfrm>
-            <a:off x="4480560" y="1371600"/>
-            <a:ext cx="4572000" cy="2743200"/>
-          </a:xfrm>
-          <a:prstGeom prst="rect">
-            <a:avLst/>
-          </a:prstGeom>
-        </p:spPr>
-      </p:pic>
-      <p:pic>
-        <p:nvPicPr>
-          <p:cNvPr id="6" name="Picture 5" descr="operatingincome_1.png"/>
-          <p:cNvPicPr>
-            <a:picLocks noChangeAspect="1"/>
-          </p:cNvPicPr>
-          <p:nvPr/>
-        </p:nvPicPr>
-        <p:blipFill>
-          <a:blip r:embed="rId4"/>
-          <a:stretch>
-            <a:fillRect/>
-          </a:stretch>
-        </p:blipFill>
-        <p:spPr>
-          <a:xfrm>
-            <a:off x="822960" y="4114800"/>
-            <a:ext cx="4572000" cy="2743200"/>
-          </a:xfrm>
-          <a:prstGeom prst="rect">
-            <a:avLst/>
-          </a:prstGeom>
-        </p:spPr>
-      </p:pic>
-    </p:spTree>
-  </p:cSld>
-  <p:clrMapOvr>
-    <a:masterClrMapping/>
-  </p:clrMapOvr>
-</p:sld>
-</file>
-
-<file path=ppt/slides/slide9.xml><?xml version="1.0" encoding="utf-8"?>
-<p:sld xmlns:a="http://schemas.openxmlformats.org/drawingml/2006/main" xmlns:p="http://schemas.openxmlformats.org/presentationml/2006/main" xmlns:r="http://schemas.openxmlformats.org/officeDocument/2006/relationships">
-  <p:cSld>
-    <p:spTree>
-      <p:nvGrpSpPr>
-        <p:cNvPr id="1" name=""/>
-        <p:cNvGrpSpPr/>
-        <p:nvPr/>
-      </p:nvGrpSpPr>
-      <p:grpSpPr/>
-      <p:sp>
-        <p:nvSpPr>
-          <p:cNvPr id="2" name="Title 1"/>
-          <p:cNvSpPr>
-            <a:spLocks noGrp="1"/>
-          </p:cNvSpPr>
-          <p:nvPr>
-            <p:ph type="title"/>
-          </p:nvPr>
-        </p:nvSpPr>
-        <p:spPr/>
-        <p:txBody>
-          <a:bodyPr/>
-          <a:lstStyle/>
-          <a:p>
-            <a:r>
-              <a:t>cashflow figures</a:t>
-            </a:r>
-          </a:p>
-        </p:txBody>
-      </p:sp>
-      <p:sp>
-        <p:nvSpPr>
-          <p:cNvPr id="3" name="Content Placeholder 2"/>
-          <p:cNvSpPr>
-            <a:spLocks noGrp="1"/>
-          </p:cNvSpPr>
-          <p:nvPr>
-            <p:ph idx="1"/>
-          </p:nvPr>
-        </p:nvSpPr>
-        <p:spPr/>
-        <p:txBody>
-          <a:bodyPr/>
-          <a:lstStyle/>
-          <a:p/>
-        </p:txBody>
-      </p:sp>
-      <p:pic>
-        <p:nvPicPr>
-          <p:cNvPr id="4" name="Picture 3" descr="cashflow_1.png"/>
-          <p:cNvPicPr>
-            <a:picLocks noChangeAspect="1"/>
-          </p:cNvPicPr>
-          <p:nvPr/>
-        </p:nvPicPr>
-        <p:blipFill>
-          <a:blip r:embed="rId2"/>
-          <a:stretch>
-            <a:fillRect/>
-          </a:stretch>
-        </p:blipFill>
-        <p:spPr>
-          <a:xfrm>
-            <a:off x="822960" y="1371600"/>
-            <a:ext cx="4572000" cy="2743200"/>
-          </a:xfrm>
-          <a:prstGeom prst="rect">
-            <a:avLst/>
-          </a:prstGeom>
-        </p:spPr>
-      </p:pic>
-      <p:pic>
-        <p:nvPicPr>
-          <p:cNvPr id="5" name="Picture 4" descr="cashflow_3.png"/>
-          <p:cNvPicPr>
-            <a:picLocks noChangeAspect="1"/>
-          </p:cNvPicPr>
-          <p:nvPr/>
-        </p:nvPicPr>
-        <p:blipFill>
-          <a:blip r:embed="rId3"/>
-          <a:stretch>
-            <a:fillRect/>
-          </a:stretch>
-        </p:blipFill>
-        <p:spPr>
-          <a:xfrm>
-            <a:off x="4480560" y="1371600"/>
-            <a:ext cx="4572000" cy="2743200"/>
-          </a:xfrm>
-          <a:prstGeom prst="rect">
-            <a:avLst/>
-          </a:prstGeom>
-        </p:spPr>
-      </p:pic>
-      <p:pic>
-        <p:nvPicPr>
-          <p:cNvPr id="6" name="Picture 5" descr="cashflow_2.png"/>
-          <p:cNvPicPr>
-            <a:picLocks noChangeAspect="1"/>
-          </p:cNvPicPr>
-          <p:nvPr/>
-        </p:nvPicPr>
-        <p:blipFill>
-          <a:blip r:embed="rId4"/>
-          <a:stretch>
-            <a:fillRect/>
-          </a:stretch>
-        </p:blipFill>
-        <p:spPr>
-          <a:xfrm>
-            <a:off x="822960" y="4114800"/>
-            <a:ext cx="4572000" cy="2743200"/>
-          </a:xfrm>
-          <a:prstGeom prst="rect">
-            <a:avLst/>
-          </a:prstGeom>
-        </p:spPr>
-      </p:pic>
+              <a:t>It seems that there are no documents currently uploaded. Please upload the financial statements or any relevant documents that contain information about the "Test Item" of the company. Once the documents are uploaded, I can analyze the data and provide a detailed analysis of how the "Test Item" has changed over time.</a:t>
+            </a:r>
+          </a:p>
+        </p:txBody>
+      </p:sp>
     </p:spTree>
   </p:cSld>
   <p:clrMapOvr>

</xml_diff>